<commit_message>
Export template modify for PPT
</commit_message>
<xml_diff>
--- a/Merck Sereno Dashboard/Dashboard/Content/ExportTemplate/pptxTemplateWithHeader.pptx
+++ b/Merck Sereno Dashboard/Dashboard/Content/ExportTemplate/pptxTemplateWithHeader.pptx
@@ -289,7 +289,7 @@
             <a:fld id="{684BAA20-E9D4-474D-B3FD-B059F9E284A9}" type="datetimeFigureOut">
               <a:rPr lang="en-US" smtClean="0"/>
               <a:pPr/>
-              <a:t>2/25/2015</a:t>
+              <a:t>7/3/2015</a:t>
             </a:fld>
             <a:endParaRPr lang="en-US"/>
           </a:p>
@@ -461,7 +461,7 @@
             <a:fld id="{684BAA20-E9D4-474D-B3FD-B059F9E284A9}" type="datetimeFigureOut">
               <a:rPr lang="en-US" smtClean="0"/>
               <a:pPr/>
-              <a:t>2/25/2015</a:t>
+              <a:t>7/3/2015</a:t>
             </a:fld>
             <a:endParaRPr lang="en-US"/>
           </a:p>
@@ -643,7 +643,7 @@
             <a:fld id="{684BAA20-E9D4-474D-B3FD-B059F9E284A9}" type="datetimeFigureOut">
               <a:rPr lang="en-US" smtClean="0"/>
               <a:pPr/>
-              <a:t>2/25/2015</a:t>
+              <a:t>7/3/2015</a:t>
             </a:fld>
             <a:endParaRPr lang="en-US"/>
           </a:p>
@@ -815,7 +815,7 @@
             <a:fld id="{684BAA20-E9D4-474D-B3FD-B059F9E284A9}" type="datetimeFigureOut">
               <a:rPr lang="en-US" smtClean="0"/>
               <a:pPr/>
-              <a:t>2/25/2015</a:t>
+              <a:t>7/3/2015</a:t>
             </a:fld>
             <a:endParaRPr lang="en-US"/>
           </a:p>
@@ -1063,7 +1063,7 @@
             <a:fld id="{684BAA20-E9D4-474D-B3FD-B059F9E284A9}" type="datetimeFigureOut">
               <a:rPr lang="en-US" smtClean="0"/>
               <a:pPr/>
-              <a:t>2/25/2015</a:t>
+              <a:t>7/3/2015</a:t>
             </a:fld>
             <a:endParaRPr lang="en-US"/>
           </a:p>
@@ -1353,7 +1353,7 @@
             <a:fld id="{684BAA20-E9D4-474D-B3FD-B059F9E284A9}" type="datetimeFigureOut">
               <a:rPr lang="en-US" smtClean="0"/>
               <a:pPr/>
-              <a:t>2/25/2015</a:t>
+              <a:t>7/3/2015</a:t>
             </a:fld>
             <a:endParaRPr lang="en-US"/>
           </a:p>
@@ -1777,7 +1777,7 @@
             <a:fld id="{684BAA20-E9D4-474D-B3FD-B059F9E284A9}" type="datetimeFigureOut">
               <a:rPr lang="en-US" smtClean="0"/>
               <a:pPr/>
-              <a:t>2/25/2015</a:t>
+              <a:t>7/3/2015</a:t>
             </a:fld>
             <a:endParaRPr lang="en-US"/>
           </a:p>
@@ -1897,7 +1897,7 @@
             <a:fld id="{684BAA20-E9D4-474D-B3FD-B059F9E284A9}" type="datetimeFigureOut">
               <a:rPr lang="en-US" smtClean="0"/>
               <a:pPr/>
-              <a:t>2/25/2015</a:t>
+              <a:t>7/3/2015</a:t>
             </a:fld>
             <a:endParaRPr lang="en-US"/>
           </a:p>
@@ -1994,7 +1994,7 @@
             <a:fld id="{684BAA20-E9D4-474D-B3FD-B059F9E284A9}" type="datetimeFigureOut">
               <a:rPr lang="en-US" smtClean="0"/>
               <a:pPr/>
-              <a:t>2/25/2015</a:t>
+              <a:t>7/3/2015</a:t>
             </a:fld>
             <a:endParaRPr lang="en-US"/>
           </a:p>
@@ -2273,7 +2273,7 @@
             <a:fld id="{684BAA20-E9D4-474D-B3FD-B059F9E284A9}" type="datetimeFigureOut">
               <a:rPr lang="en-US" smtClean="0"/>
               <a:pPr/>
-              <a:t>2/25/2015</a:t>
+              <a:t>7/3/2015</a:t>
             </a:fld>
             <a:endParaRPr lang="en-US"/>
           </a:p>
@@ -2528,7 +2528,7 @@
             <a:fld id="{684BAA20-E9D4-474D-B3FD-B059F9E284A9}" type="datetimeFigureOut">
               <a:rPr lang="en-US" smtClean="0"/>
               <a:pPr/>
-              <a:t>2/25/2015</a:t>
+              <a:t>7/3/2015</a:t>
             </a:fld>
             <a:endParaRPr lang="en-US"/>
           </a:p>
@@ -2743,7 +2743,7 @@
             <a:fld id="{684BAA20-E9D4-474D-B3FD-B059F9E284A9}" type="datetimeFigureOut">
               <a:rPr lang="en-US" smtClean="0"/>
               <a:pPr/>
-              <a:t>2/25/2015</a:t>
+              <a:t>7/3/2015</a:t>
             </a:fld>
             <a:endParaRPr lang="en-US"/>
           </a:p>
@@ -3121,9 +3121,9 @@
       </p:grpSpPr>
       <p:pic>
         <p:nvPicPr>
-          <p:cNvPr id="2" name="Picture 1"/>
+          <p:cNvPr id="1029" name="Picture 5" descr="C:\Users\sharun\Desktop\Capture - Copy.PNG"/>
           <p:cNvPicPr>
-            <a:picLocks noChangeAspect="1"/>
+            <a:picLocks noChangeAspect="1" noChangeArrowheads="1"/>
           </p:cNvPicPr>
           <p:nvPr/>
         </p:nvPicPr>
@@ -3135,18 +3135,29 @@
               </a:ext>
             </a:extLst>
           </a:blip>
+          <a:srcRect/>
           <a:stretch>
             <a:fillRect/>
           </a:stretch>
         </p:blipFill>
-        <p:spPr>
+        <p:spPr bwMode="auto">
           <a:xfrm>
-            <a:off x="339441" y="152401"/>
-            <a:ext cx="8478980" cy="586227"/>
+            <a:off x="76201" y="55415"/>
+            <a:ext cx="8970963" cy="676275"/>
           </a:xfrm>
           <a:prstGeom prst="rect">
             <a:avLst/>
           </a:prstGeom>
+          <a:noFill/>
+          <a:extLst>
+            <a:ext uri="{909E8E84-426E-40DD-AFC4-6F175D3DCCD1}">
+              <a14:hiddenFill xmlns:a14="http://schemas.microsoft.com/office/drawing/2010/main">
+                <a:solidFill>
+                  <a:srgbClr val="FFFFFF"/>
+                </a:solidFill>
+              </a14:hiddenFill>
+            </a:ext>
+          </a:extLst>
         </p:spPr>
       </p:pic>
     </p:spTree>

</xml_diff>